<commit_message>
minor revisions to functions slides
</commit_message>
<xml_diff>
--- a/content/cse115/media/115Slides/3-Functions.pptx
+++ b/content/cse115/media/115Slides/3-Functions.pptx
@@ -5,7 +5,7 @@
     <p:sldMasterId id="2147483660" r:id="rId1"/>
   </p:sldMasterIdLst>
   <p:notesMasterIdLst>
-    <p:notesMasterId r:id="rId16"/>
+    <p:notesMasterId r:id="rId17"/>
   </p:notesMasterIdLst>
   <p:sldIdLst>
     <p:sldId id="256" r:id="rId2"/>
@@ -18,10 +18,11 @@
     <p:sldId id="282" r:id="rId9"/>
     <p:sldId id="283" r:id="rId10"/>
     <p:sldId id="284" r:id="rId11"/>
-    <p:sldId id="272" r:id="rId12"/>
-    <p:sldId id="285" r:id="rId13"/>
-    <p:sldId id="279" r:id="rId14"/>
-    <p:sldId id="280" r:id="rId15"/>
+    <p:sldId id="286" r:id="rId12"/>
+    <p:sldId id="272" r:id="rId13"/>
+    <p:sldId id="285" r:id="rId14"/>
+    <p:sldId id="279" r:id="rId15"/>
+    <p:sldId id="280" r:id="rId16"/>
   </p:sldIdLst>
   <p:sldSz cx="9144000" cy="6858000" type="screen4x3"/>
   <p:notesSz cx="6858000" cy="9144000"/>
@@ -3627,6 +3628,109 @@
       </p:grpSpPr>
       <p:sp>
         <p:nvSpPr>
+          <p:cNvPr id="12" name="Rounded Rectangle 11"/>
+          <p:cNvSpPr/>
+          <p:nvPr/>
+        </p:nvSpPr>
+        <p:spPr>
+          <a:xfrm>
+            <a:off x="2845695" y="2621579"/>
+            <a:ext cx="3130775" cy="1367716"/>
+          </a:xfrm>
+          <a:prstGeom prst="roundRect">
+            <a:avLst/>
+          </a:prstGeom>
+          <a:ln/>
+        </p:spPr>
+        <p:style>
+          <a:lnRef idx="1">
+            <a:schemeClr val="accent1"/>
+          </a:lnRef>
+          <a:fillRef idx="3">
+            <a:schemeClr val="accent1"/>
+          </a:fillRef>
+          <a:effectRef idx="2">
+            <a:schemeClr val="accent1"/>
+          </a:effectRef>
+          <a:fontRef idx="minor">
+            <a:schemeClr val="lt1"/>
+          </a:fontRef>
+        </p:style>
+        <p:txBody>
+          <a:bodyPr/>
+          <a:lstStyle/>
+          <a:p>
+            <a:pPr algn="ctr"/>
+            <a:r>
+              <a:rPr lang="en-US" sz="3200" dirty="0" smtClean="0"/>
+              <a:t>Drive from home to school</a:t>
+            </a:r>
+            <a:endParaRPr lang="en-US" sz="3200" dirty="0"/>
+          </a:p>
+        </p:txBody>
+      </p:sp>
+      <p:sp>
+        <p:nvSpPr>
+          <p:cNvPr id="4" name="Title 3"/>
+          <p:cNvSpPr>
+            <a:spLocks noGrp="1"/>
+          </p:cNvSpPr>
+          <p:nvPr>
+            <p:ph type="title"/>
+          </p:nvPr>
+        </p:nvSpPr>
+        <p:spPr/>
+        <p:txBody>
+          <a:bodyPr/>
+          <a:lstStyle/>
+          <a:p>
+            <a:r>
+              <a:rPr lang="en-US" dirty="0" smtClean="0"/>
+              <a:t>Hide the details</a:t>
+            </a:r>
+            <a:endParaRPr lang="en-US" dirty="0"/>
+          </a:p>
+        </p:txBody>
+      </p:sp>
+    </p:spTree>
+    <p:extLst>
+      <p:ext uri="{BB962C8B-B14F-4D97-AF65-F5344CB8AC3E}">
+        <p14:creationId xmlns:p14="http://schemas.microsoft.com/office/powerpoint/2010/main" val="1790091499"/>
+      </p:ext>
+    </p:extLst>
+  </p:cSld>
+  <p:clrMapOvr>
+    <a:masterClrMapping/>
+  </p:clrMapOvr>
+  <p:timing>
+    <p:tnLst>
+      <p:par>
+        <p:cTn xmlns:p14="http://schemas.microsoft.com/office/powerpoint/2010/main" id="1" dur="indefinite" restart="never" nodeType="tmRoot"/>
+      </p:par>
+    </p:tnLst>
+  </p:timing>
+</p:sld>
+</file>
+
+<file path=ppt/slides/slide12.xml><?xml version="1.0" encoding="utf-8"?>
+<p:sld xmlns:a="http://schemas.openxmlformats.org/drawingml/2006/main" xmlns:r="http://schemas.openxmlformats.org/officeDocument/2006/relationships" xmlns:p="http://schemas.openxmlformats.org/presentationml/2006/main">
+  <p:cSld>
+    <p:spTree>
+      <p:nvGrpSpPr>
+        <p:cNvPr id="1" name=""/>
+        <p:cNvGrpSpPr/>
+        <p:nvPr/>
+      </p:nvGrpSpPr>
+      <p:grpSpPr>
+        <a:xfrm>
+          <a:off x="0" y="0"/>
+          <a:ext cx="0" cy="0"/>
+          <a:chOff x="0" y="0"/>
+          <a:chExt cx="0" cy="0"/>
+        </a:xfrm>
+      </p:grpSpPr>
+      <p:sp>
+        <p:nvSpPr>
           <p:cNvPr id="2" name="Title 1"/>
           <p:cNvSpPr>
             <a:spLocks noGrp="1"/>
@@ -3902,7 +4006,7 @@
 </p:sld>
 </file>
 
-<file path=ppt/slides/slide12.xml><?xml version="1.0" encoding="utf-8"?>
+<file path=ppt/slides/slide13.xml><?xml version="1.0" encoding="utf-8"?>
 <p:sld xmlns:a="http://schemas.openxmlformats.org/drawingml/2006/main" xmlns:r="http://schemas.openxmlformats.org/officeDocument/2006/relationships" xmlns:p="http://schemas.openxmlformats.org/presentationml/2006/main">
   <p:cSld>
     <p:spTree>
@@ -4025,7 +4129,7 @@
 </p:sld>
 </file>
 
-<file path=ppt/slides/slide13.xml><?xml version="1.0" encoding="utf-8"?>
+<file path=ppt/slides/slide14.xml><?xml version="1.0" encoding="utf-8"?>
 <p:sld xmlns:a="http://schemas.openxmlformats.org/drawingml/2006/main" xmlns:r="http://schemas.openxmlformats.org/officeDocument/2006/relationships" xmlns:p="http://schemas.openxmlformats.org/presentationml/2006/main">
   <p:cSld>
     <p:spTree>
@@ -4104,7 +4208,7 @@
 </p:sld>
 </file>
 
-<file path=ppt/slides/slide14.xml><?xml version="1.0" encoding="utf-8"?>
+<file path=ppt/slides/slide15.xml><?xml version="1.0" encoding="utf-8"?>
 <p:sld xmlns:a="http://schemas.openxmlformats.org/drawingml/2006/main" xmlns:r="http://schemas.openxmlformats.org/officeDocument/2006/relationships" xmlns:p="http://schemas.openxmlformats.org/presentationml/2006/main">
   <p:cSld>
     <p:spTree>
@@ -4763,15 +4867,33 @@
                                   </p:childTnLst>
                                 </p:cTn>
                               </p:par>
+                            </p:childTnLst>
+                          </p:cTn>
+                        </p:par>
+                      </p:childTnLst>
+                    </p:cTn>
+                  </p:par>
+                  <p:par>
+                    <p:cTn id="15" fill="hold">
+                      <p:stCondLst>
+                        <p:cond delay="indefinite"/>
+                      </p:stCondLst>
+                      <p:childTnLst>
+                        <p:par>
+                          <p:cTn id="16" fill="hold">
+                            <p:stCondLst>
+                              <p:cond delay="0"/>
+                            </p:stCondLst>
+                            <p:childTnLst>
                               <p:par>
-                                <p:cTn id="15" presetID="1" presetClass="entr" presetSubtype="0" fill="hold" grpId="0" nodeType="withEffect">
+                                <p:cTn id="17" presetID="1" presetClass="entr" presetSubtype="0" fill="hold" grpId="0" nodeType="clickEffect">
                                   <p:stCondLst>
                                     <p:cond delay="0"/>
                                   </p:stCondLst>
                                   <p:childTnLst>
                                     <p:set>
                                       <p:cBhvr>
-                                        <p:cTn id="16" dur="1" fill="hold">
+                                        <p:cTn id="18" dur="1" fill="hold">
                                           <p:stCondLst>
                                             <p:cond delay="0"/>
                                           </p:stCondLst>
@@ -4801,26 +4923,26 @@
                     </p:cTn>
                   </p:par>
                   <p:par>
-                    <p:cTn id="17" fill="hold">
+                    <p:cTn id="19" fill="hold">
                       <p:stCondLst>
                         <p:cond delay="indefinite"/>
                       </p:stCondLst>
                       <p:childTnLst>
                         <p:par>
-                          <p:cTn id="18" fill="hold">
+                          <p:cTn id="20" fill="hold">
                             <p:stCondLst>
                               <p:cond delay="0"/>
                             </p:stCondLst>
                             <p:childTnLst>
                               <p:par>
-                                <p:cTn id="19" presetID="1" presetClass="entr" presetSubtype="0" fill="hold" grpId="0" nodeType="clickEffect">
+                                <p:cTn id="21" presetID="1" presetClass="entr" presetSubtype="0" fill="hold" grpId="0" nodeType="clickEffect">
                                   <p:stCondLst>
                                     <p:cond delay="0"/>
                                   </p:stCondLst>
                                   <p:childTnLst>
                                     <p:set>
                                       <p:cBhvr>
-                                        <p:cTn id="20" dur="1" fill="hold">
+                                        <p:cTn id="22" dur="1" fill="hold">
                                           <p:stCondLst>
                                             <p:cond delay="0"/>
                                           </p:stCondLst>
@@ -4871,7 +4993,7 @@
       </p:par>
     </p:tnLst>
     <p:bldLst>
-      <p:bldP spid="3" grpId="0" build="p"/>
+      <p:bldP spid="3" grpId="0" uiExpand="1" build="p"/>
     </p:bldLst>
   </p:timing>
 </p:sld>

</xml_diff>